<commit_message>
Changed some slides and notes added Modelica 1st exercise updated
</commit_message>
<xml_diff>
--- a/hybridGEOTABS/Presentations/IDEAS buildings.pptx
+++ b/hybridGEOTABS/Presentations/IDEAS buildings.pptx
@@ -215,7 +215,7 @@
           <a:p>
             <a:fld id="{4A8DCA80-FE92-4276-88FD-1AF6149EC4EE}" type="datetimeFigureOut">
               <a:rPr lang="en-US" smtClean="0"/>
-              <a:t>4/24/2017</a:t>
+              <a:t>5/2/2017</a:t>
             </a:fld>
             <a:endParaRPr lang="en-US"/>
           </a:p>
@@ -1049,6 +1049,358 @@
       </p:grpSpPr>
       <p:sp>
         <p:nvSpPr>
+          <p:cNvPr id="2" name="Slide Image Placeholder 1"/>
+          <p:cNvSpPr>
+            <a:spLocks noGrp="1" noRot="1" noChangeAspect="1"/>
+          </p:cNvSpPr>
+          <p:nvPr>
+            <p:ph type="sldImg"/>
+          </p:nvPr>
+        </p:nvSpPr>
+        <p:spPr/>
+      </p:sp>
+      <p:sp>
+        <p:nvSpPr>
+          <p:cNvPr id="3" name="Notes Placeholder 2"/>
+          <p:cNvSpPr>
+            <a:spLocks noGrp="1"/>
+          </p:cNvSpPr>
+          <p:nvPr>
+            <p:ph type="body" idx="1"/>
+          </p:nvPr>
+        </p:nvSpPr>
+        <p:spPr/>
+        <p:txBody>
+          <a:bodyPr/>
+          <a:lstStyle/>
+          <a:p>
+            <a:r>
+              <a:rPr lang="gl-ES" dirty="0" smtClean="0"/>
+              <a:t>The first part to model into a building should be the envelope</a:t>
+            </a:r>
+            <a:endParaRPr lang="en-US" dirty="0"/>
+          </a:p>
+        </p:txBody>
+      </p:sp>
+      <p:sp>
+        <p:nvSpPr>
+          <p:cNvPr id="4" name="Slide Number Placeholder 3"/>
+          <p:cNvSpPr>
+            <a:spLocks noGrp="1"/>
+          </p:cNvSpPr>
+          <p:nvPr>
+            <p:ph type="sldNum" sz="quarter" idx="10"/>
+          </p:nvPr>
+        </p:nvSpPr>
+        <p:spPr/>
+        <p:txBody>
+          <a:bodyPr/>
+          <a:lstStyle/>
+          <a:p>
+            <a:fld id="{72A650E0-C7F6-4296-B91B-1AE94F62C31D}" type="slidenum">
+              <a:rPr lang="en-US" smtClean="0"/>
+              <a:t>2</a:t>
+            </a:fld>
+            <a:endParaRPr lang="en-US"/>
+          </a:p>
+        </p:txBody>
+      </p:sp>
+    </p:spTree>
+    <p:extLst>
+      <p:ext uri="{BB962C8B-B14F-4D97-AF65-F5344CB8AC3E}">
+        <p14:creationId xmlns:p14="http://schemas.microsoft.com/office/powerpoint/2010/main" val="911836855"/>
+      </p:ext>
+    </p:extLst>
+  </p:cSld>
+  <p:clrMapOvr>
+    <a:masterClrMapping/>
+  </p:clrMapOvr>
+</p:notes>
+</file>
+
+<file path=ppt/notesSlides/notesSlide3.xml><?xml version="1.0" encoding="utf-8"?>
+<p:notes xmlns:a="http://schemas.openxmlformats.org/drawingml/2006/main" xmlns:r="http://schemas.openxmlformats.org/officeDocument/2006/relationships" xmlns:p="http://schemas.openxmlformats.org/presentationml/2006/main">
+  <p:cSld>
+    <p:spTree>
+      <p:nvGrpSpPr>
+        <p:cNvPr id="1" name=""/>
+        <p:cNvGrpSpPr/>
+        <p:nvPr/>
+      </p:nvGrpSpPr>
+      <p:grpSpPr>
+        <a:xfrm>
+          <a:off x="0" y="0"/>
+          <a:ext cx="0" cy="0"/>
+          <a:chOff x="0" y="0"/>
+          <a:chExt cx="0" cy="0"/>
+        </a:xfrm>
+      </p:grpSpPr>
+      <p:sp>
+        <p:nvSpPr>
+          <p:cNvPr id="2" name="Slide Image Placeholder 1"/>
+          <p:cNvSpPr>
+            <a:spLocks noGrp="1" noRot="1" noChangeAspect="1"/>
+          </p:cNvSpPr>
+          <p:nvPr>
+            <p:ph type="sldImg"/>
+          </p:nvPr>
+        </p:nvSpPr>
+        <p:spPr/>
+      </p:sp>
+      <p:sp>
+        <p:nvSpPr>
+          <p:cNvPr id="3" name="Notes Placeholder 2"/>
+          <p:cNvSpPr>
+            <a:spLocks noGrp="1"/>
+          </p:cNvSpPr>
+          <p:nvPr>
+            <p:ph type="body" idx="1"/>
+          </p:nvPr>
+        </p:nvSpPr>
+        <p:spPr/>
+        <p:txBody>
+          <a:bodyPr/>
+          <a:lstStyle/>
+          <a:p>
+            <a:r>
+              <a:rPr lang="gl-ES" dirty="0" smtClean="0"/>
+              <a:t>IDEAS will provide a template, however I do not use it. Just part by part</a:t>
+            </a:r>
+            <a:endParaRPr lang="en-US" dirty="0"/>
+          </a:p>
+        </p:txBody>
+      </p:sp>
+      <p:sp>
+        <p:nvSpPr>
+          <p:cNvPr id="4" name="Slide Number Placeholder 3"/>
+          <p:cNvSpPr>
+            <a:spLocks noGrp="1"/>
+          </p:cNvSpPr>
+          <p:nvPr>
+            <p:ph type="sldNum" sz="quarter" idx="10"/>
+          </p:nvPr>
+        </p:nvSpPr>
+        <p:spPr/>
+        <p:txBody>
+          <a:bodyPr/>
+          <a:lstStyle/>
+          <a:p>
+            <a:fld id="{72A650E0-C7F6-4296-B91B-1AE94F62C31D}" type="slidenum">
+              <a:rPr lang="en-US" smtClean="0"/>
+              <a:t>3</a:t>
+            </a:fld>
+            <a:endParaRPr lang="en-US"/>
+          </a:p>
+        </p:txBody>
+      </p:sp>
+    </p:spTree>
+    <p:extLst>
+      <p:ext uri="{BB962C8B-B14F-4D97-AF65-F5344CB8AC3E}">
+        <p14:creationId xmlns:p14="http://schemas.microsoft.com/office/powerpoint/2010/main" val="2993512548"/>
+      </p:ext>
+    </p:extLst>
+  </p:cSld>
+  <p:clrMapOvr>
+    <a:masterClrMapping/>
+  </p:clrMapOvr>
+</p:notes>
+</file>
+
+<file path=ppt/notesSlides/notesSlide4.xml><?xml version="1.0" encoding="utf-8"?>
+<p:notes xmlns:a="http://schemas.openxmlformats.org/drawingml/2006/main" xmlns:r="http://schemas.openxmlformats.org/officeDocument/2006/relationships" xmlns:p="http://schemas.openxmlformats.org/presentationml/2006/main">
+  <p:cSld>
+    <p:spTree>
+      <p:nvGrpSpPr>
+        <p:cNvPr id="1" name=""/>
+        <p:cNvGrpSpPr/>
+        <p:nvPr/>
+      </p:nvGrpSpPr>
+      <p:grpSpPr>
+        <a:xfrm>
+          <a:off x="0" y="0"/>
+          <a:ext cx="0" cy="0"/>
+          <a:chOff x="0" y="0"/>
+          <a:chExt cx="0" cy="0"/>
+        </a:xfrm>
+      </p:grpSpPr>
+      <p:sp>
+        <p:nvSpPr>
+          <p:cNvPr id="2" name="Slide Image Placeholder 1"/>
+          <p:cNvSpPr>
+            <a:spLocks noGrp="1" noRot="1" noChangeAspect="1"/>
+          </p:cNvSpPr>
+          <p:nvPr>
+            <p:ph type="sldImg"/>
+          </p:nvPr>
+        </p:nvSpPr>
+        <p:spPr/>
+      </p:sp>
+      <p:sp>
+        <p:nvSpPr>
+          <p:cNvPr id="3" name="Notes Placeholder 2"/>
+          <p:cNvSpPr>
+            <a:spLocks noGrp="1"/>
+          </p:cNvSpPr>
+          <p:nvPr>
+            <p:ph type="body" idx="1"/>
+          </p:nvPr>
+        </p:nvSpPr>
+        <p:spPr/>
+        <p:txBody>
+          <a:bodyPr/>
+          <a:lstStyle/>
+          <a:p>
+            <a:r>
+              <a:rPr lang="gl-ES" dirty="0" smtClean="0"/>
+              <a:t>Types of wall</a:t>
+            </a:r>
+            <a:endParaRPr lang="en-US" dirty="0"/>
+          </a:p>
+        </p:txBody>
+      </p:sp>
+      <p:sp>
+        <p:nvSpPr>
+          <p:cNvPr id="4" name="Slide Number Placeholder 3"/>
+          <p:cNvSpPr>
+            <a:spLocks noGrp="1"/>
+          </p:cNvSpPr>
+          <p:nvPr>
+            <p:ph type="sldNum" sz="quarter" idx="10"/>
+          </p:nvPr>
+        </p:nvSpPr>
+        <p:spPr/>
+        <p:txBody>
+          <a:bodyPr/>
+          <a:lstStyle/>
+          <a:p>
+            <a:fld id="{72A650E0-C7F6-4296-B91B-1AE94F62C31D}" type="slidenum">
+              <a:rPr lang="en-US" smtClean="0"/>
+              <a:t>4</a:t>
+            </a:fld>
+            <a:endParaRPr lang="en-US"/>
+          </a:p>
+        </p:txBody>
+      </p:sp>
+    </p:spTree>
+    <p:extLst>
+      <p:ext uri="{BB962C8B-B14F-4D97-AF65-F5344CB8AC3E}">
+        <p14:creationId xmlns:p14="http://schemas.microsoft.com/office/powerpoint/2010/main" val="2067855381"/>
+      </p:ext>
+    </p:extLst>
+  </p:cSld>
+  <p:clrMapOvr>
+    <a:masterClrMapping/>
+  </p:clrMapOvr>
+</p:notes>
+</file>
+
+<file path=ppt/notesSlides/notesSlide5.xml><?xml version="1.0" encoding="utf-8"?>
+<p:notes xmlns:a="http://schemas.openxmlformats.org/drawingml/2006/main" xmlns:r="http://schemas.openxmlformats.org/officeDocument/2006/relationships" xmlns:p="http://schemas.openxmlformats.org/presentationml/2006/main">
+  <p:cSld>
+    <p:spTree>
+      <p:nvGrpSpPr>
+        <p:cNvPr id="1" name=""/>
+        <p:cNvGrpSpPr/>
+        <p:nvPr/>
+      </p:nvGrpSpPr>
+      <p:grpSpPr>
+        <a:xfrm>
+          <a:off x="0" y="0"/>
+          <a:ext cx="0" cy="0"/>
+          <a:chOff x="0" y="0"/>
+          <a:chExt cx="0" cy="0"/>
+        </a:xfrm>
+      </p:grpSpPr>
+      <p:sp>
+        <p:nvSpPr>
+          <p:cNvPr id="2" name="Slide Image Placeholder 1"/>
+          <p:cNvSpPr>
+            <a:spLocks noGrp="1" noRot="1" noChangeAspect="1"/>
+          </p:cNvSpPr>
+          <p:nvPr>
+            <p:ph type="sldImg"/>
+          </p:nvPr>
+        </p:nvSpPr>
+        <p:spPr/>
+      </p:sp>
+      <p:sp>
+        <p:nvSpPr>
+          <p:cNvPr id="3" name="Notes Placeholder 2"/>
+          <p:cNvSpPr>
+            <a:spLocks noGrp="1"/>
+          </p:cNvSpPr>
+          <p:nvPr>
+            <p:ph type="body" idx="1"/>
+          </p:nvPr>
+        </p:nvSpPr>
+        <p:spPr/>
+        <p:txBody>
+          <a:bodyPr/>
+          <a:lstStyle/>
+          <a:p>
+            <a:r>
+              <a:rPr lang="gl-ES" dirty="0" smtClean="0"/>
+              <a:t>Create your own walls composition and materials!</a:t>
+            </a:r>
+            <a:endParaRPr lang="en-US" dirty="0"/>
+          </a:p>
+        </p:txBody>
+      </p:sp>
+      <p:sp>
+        <p:nvSpPr>
+          <p:cNvPr id="4" name="Slide Number Placeholder 3"/>
+          <p:cNvSpPr>
+            <a:spLocks noGrp="1"/>
+          </p:cNvSpPr>
+          <p:nvPr>
+            <p:ph type="sldNum" sz="quarter" idx="10"/>
+          </p:nvPr>
+        </p:nvSpPr>
+        <p:spPr/>
+        <p:txBody>
+          <a:bodyPr/>
+          <a:lstStyle/>
+          <a:p>
+            <a:fld id="{72A650E0-C7F6-4296-B91B-1AE94F62C31D}" type="slidenum">
+              <a:rPr lang="en-US" smtClean="0"/>
+              <a:t>5</a:t>
+            </a:fld>
+            <a:endParaRPr lang="en-US"/>
+          </a:p>
+        </p:txBody>
+      </p:sp>
+    </p:spTree>
+    <p:extLst>
+      <p:ext uri="{BB962C8B-B14F-4D97-AF65-F5344CB8AC3E}">
+        <p14:creationId xmlns:p14="http://schemas.microsoft.com/office/powerpoint/2010/main" val="4086373790"/>
+      </p:ext>
+    </p:extLst>
+  </p:cSld>
+  <p:clrMapOvr>
+    <a:masterClrMapping/>
+  </p:clrMapOvr>
+</p:notes>
+</file>
+
+<file path=ppt/notesSlides/notesSlide6.xml><?xml version="1.0" encoding="utf-8"?>
+<p:notes xmlns:a="http://schemas.openxmlformats.org/drawingml/2006/main" xmlns:r="http://schemas.openxmlformats.org/officeDocument/2006/relationships" xmlns:p="http://schemas.openxmlformats.org/presentationml/2006/main">
+  <p:cSld>
+    <p:spTree>
+      <p:nvGrpSpPr>
+        <p:cNvPr id="1" name=""/>
+        <p:cNvGrpSpPr/>
+        <p:nvPr/>
+      </p:nvGrpSpPr>
+      <p:grpSpPr>
+        <a:xfrm>
+          <a:off x="0" y="0"/>
+          <a:ext cx="0" cy="0"/>
+          <a:chOff x="0" y="0"/>
+          <a:chExt cx="0" cy="0"/>
+        </a:xfrm>
+      </p:grpSpPr>
+      <p:sp>
+        <p:nvSpPr>
           <p:cNvPr id="28674" name="Slide Image Placeholder 1"/>
           <p:cNvSpPr>
             <a:spLocks noGrp="1" noRot="1" noChangeAspect="1" noTextEdit="1"/>
@@ -1577,7 +1929,7 @@
 </p:notes>
 </file>
 
-<file path=ppt/notesSlides/notesSlide3.xml><?xml version="1.0" encoding="utf-8"?>
+<file path=ppt/notesSlides/notesSlide7.xml><?xml version="1.0" encoding="utf-8"?>
 <p:notes xmlns:a="http://schemas.openxmlformats.org/drawingml/2006/main" xmlns:r="http://schemas.openxmlformats.org/officeDocument/2006/relationships" xmlns:p="http://schemas.openxmlformats.org/presentationml/2006/main">
   <p:cSld>
     <p:spTree>
@@ -2120,7 +2472,7 @@
 </p:notes>
 </file>
 
-<file path=ppt/notesSlides/notesSlide4.xml><?xml version="1.0" encoding="utf-8"?>
+<file path=ppt/notesSlides/notesSlide8.xml><?xml version="1.0" encoding="utf-8"?>
 <p:notes xmlns:a="http://schemas.openxmlformats.org/drawingml/2006/main" xmlns:r="http://schemas.openxmlformats.org/officeDocument/2006/relationships" xmlns:p="http://schemas.openxmlformats.org/presentationml/2006/main">
   <p:cSld>
     <p:spTree>
@@ -2833,7 +3185,7 @@
             <a:fld id="{87DE6118-2437-4B30-8E3C-4D2BE6020583}" type="datetimeFigureOut">
               <a:rPr lang="en-US" smtClean="0"/>
               <a:pPr/>
-              <a:t>4/24/2017</a:t>
+              <a:t>5/2/2017</a:t>
             </a:fld>
             <a:endParaRPr lang="en-US" dirty="0"/>
           </a:p>
@@ -3316,7 +3668,7 @@
             <a:fld id="{87DE6118-2437-4B30-8E3C-4D2BE6020583}" type="datetimeFigureOut">
               <a:rPr lang="en-US" smtClean="0"/>
               <a:pPr/>
-              <a:t>4/24/2017</a:t>
+              <a:t>5/2/2017</a:t>
             </a:fld>
             <a:endParaRPr lang="en-US" dirty="0"/>
           </a:p>
@@ -3594,7 +3946,7 @@
           <a:p>
             <a:fld id="{87DE6118-2437-4B30-8E3C-4D2BE6020583}" type="datetimeFigureOut">
               <a:rPr lang="en-US" smtClean="0"/>
-              <a:t>4/24/2017</a:t>
+              <a:t>5/2/2017</a:t>
             </a:fld>
             <a:endParaRPr lang="en-US" dirty="0"/>
           </a:p>
@@ -3774,7 +4126,7 @@
           <a:p>
             <a:fld id="{87DE6118-2437-4B30-8E3C-4D2BE6020583}" type="datetimeFigureOut">
               <a:rPr lang="en-US" smtClean="0"/>
-              <a:t>4/24/2017</a:t>
+              <a:t>5/2/2017</a:t>
             </a:fld>
             <a:endParaRPr lang="en-US" dirty="0"/>
           </a:p>
@@ -3944,7 +4296,7 @@
           <a:p>
             <a:fld id="{87DE6118-2437-4B30-8E3C-4D2BE6020583}" type="datetimeFigureOut">
               <a:rPr lang="en-US" smtClean="0"/>
-              <a:t>4/24/2017</a:t>
+              <a:t>5/2/2017</a:t>
             </a:fld>
             <a:endParaRPr lang="en-US" dirty="0"/>
           </a:p>
@@ -4222,7 +4574,7 @@
             <a:fld id="{87DE6118-2437-4B30-8E3C-4D2BE6020583}" type="datetimeFigureOut">
               <a:rPr lang="en-US" smtClean="0"/>
               <a:pPr/>
-              <a:t>4/24/2017</a:t>
+              <a:t>5/2/2017</a:t>
             </a:fld>
             <a:endParaRPr lang="en-US" dirty="0"/>
           </a:p>
@@ -4673,7 +5025,7 @@
           <a:p>
             <a:fld id="{87DE6118-2437-4B30-8E3C-4D2BE6020583}" type="datetimeFigureOut">
               <a:rPr lang="en-US" smtClean="0"/>
-              <a:t>4/24/2017</a:t>
+              <a:t>5/2/2017</a:t>
             </a:fld>
             <a:endParaRPr lang="en-US" dirty="0"/>
           </a:p>
@@ -5150,7 +5502,7 @@
           <a:p>
             <a:fld id="{87DE6118-2437-4B30-8E3C-4D2BE6020583}" type="datetimeFigureOut">
               <a:rPr lang="en-US" smtClean="0"/>
-              <a:t>4/24/2017</a:t>
+              <a:t>5/2/2017</a:t>
             </a:fld>
             <a:endParaRPr lang="en-US" dirty="0"/>
           </a:p>
@@ -5268,7 +5620,7 @@
           <a:p>
             <a:fld id="{87DE6118-2437-4B30-8E3C-4D2BE6020583}" type="datetimeFigureOut">
               <a:rPr lang="en-US" smtClean="0"/>
-              <a:t>4/24/2017</a:t>
+              <a:t>5/2/2017</a:t>
             </a:fld>
             <a:endParaRPr lang="en-US" dirty="0"/>
           </a:p>
@@ -5363,7 +5715,7 @@
           <a:p>
             <a:fld id="{87DE6118-2437-4B30-8E3C-4D2BE6020583}" type="datetimeFigureOut">
               <a:rPr lang="en-US" smtClean="0"/>
-              <a:t>4/24/2017</a:t>
+              <a:t>5/2/2017</a:t>
             </a:fld>
             <a:endParaRPr lang="en-US" dirty="0"/>
           </a:p>
@@ -5742,7 +6094,7 @@
             <a:fld id="{87DE6118-2437-4B30-8E3C-4D2BE6020583}" type="datetimeFigureOut">
               <a:rPr lang="en-US" smtClean="0"/>
               <a:pPr/>
-              <a:t>4/24/2017</a:t>
+              <a:t>5/2/2017</a:t>
             </a:fld>
             <a:endParaRPr lang="en-US" dirty="0"/>
           </a:p>
@@ -6060,7 +6412,7 @@
             <a:fld id="{87DE6118-2437-4B30-8E3C-4D2BE6020583}" type="datetimeFigureOut">
               <a:rPr lang="en-US" smtClean="0"/>
               <a:pPr/>
-              <a:t>4/24/2017</a:t>
+              <a:t>5/2/2017</a:t>
             </a:fld>
             <a:endParaRPr lang="en-US" dirty="0"/>
           </a:p>
@@ -6783,451 +7135,6 @@
           </a:p>
         </p:txBody>
       </p:sp>
-      <p:grpSp>
-        <p:nvGrpSpPr>
-          <p:cNvPr id="4" name="Group 3"/>
-          <p:cNvGrpSpPr/>
-          <p:nvPr/>
-        </p:nvGrpSpPr>
-        <p:grpSpPr>
-          <a:xfrm>
-            <a:off x="1642394" y="2157973"/>
-            <a:ext cx="5973509" cy="3266246"/>
-            <a:chOff x="1028698" y="2122384"/>
-            <a:chExt cx="7545224" cy="4155586"/>
-          </a:xfrm>
-        </p:grpSpPr>
-        <p:grpSp>
-          <p:nvGrpSpPr>
-            <p:cNvPr id="21508" name="Group 7"/>
-            <p:cNvGrpSpPr>
-              <a:grpSpLocks/>
-            </p:cNvGrpSpPr>
-            <p:nvPr/>
-          </p:nvGrpSpPr>
-          <p:grpSpPr bwMode="auto">
-            <a:xfrm>
-              <a:off x="1028698" y="2702255"/>
-              <a:ext cx="7055893" cy="3575715"/>
-              <a:chOff x="921142" y="2261292"/>
-              <a:chExt cx="8479338" cy="4213004"/>
-            </a:xfrm>
-          </p:grpSpPr>
-          <p:pic>
-            <p:nvPicPr>
-              <p:cNvPr id="21509" name="Picture 2" descr="C:\Users\bwf\Desktop\Picture1.png"/>
-              <p:cNvPicPr>
-                <a:picLocks noChangeAspect="1" noChangeArrowheads="1"/>
-              </p:cNvPicPr>
-              <p:nvPr/>
-            </p:nvPicPr>
-            <p:blipFill>
-              <a:blip r:embed="rId3">
-                <a:clrChange>
-                  <a:clrFrom>
-                    <a:srgbClr val="FFFFFF"/>
-                  </a:clrFrom>
-                  <a:clrTo>
-                    <a:srgbClr val="FFFFFF">
-                      <a:alpha val="0"/>
-                    </a:srgbClr>
-                  </a:clrTo>
-                </a:clrChange>
-                <a:extLst>
-                  <a:ext uri="{28A0092B-C50C-407E-A947-70E740481C1C}">
-                    <a14:useLocalDpi xmlns:a14="http://schemas.microsoft.com/office/drawing/2010/main" val="0"/>
-                  </a:ext>
-                </a:extLst>
-              </a:blip>
-              <a:srcRect/>
-              <a:stretch>
-                <a:fillRect/>
-              </a:stretch>
-            </p:blipFill>
-            <p:spPr bwMode="auto">
-              <a:xfrm>
-                <a:off x="921142" y="2261292"/>
-                <a:ext cx="8479338" cy="4213004"/>
-              </a:xfrm>
-              <a:prstGeom prst="rect">
-                <a:avLst/>
-              </a:prstGeom>
-              <a:noFill/>
-              <a:ln>
-                <a:noFill/>
-              </a:ln>
-              <a:extLst>
-                <a:ext uri="{909E8E84-426E-40DD-AFC4-6F175D3DCCD1}">
-                  <a14:hiddenFill xmlns:a14="http://schemas.microsoft.com/office/drawing/2010/main">
-                    <a:solidFill>
-                      <a:srgbClr val="FFFFFF"/>
-                    </a:solidFill>
-                  </a14:hiddenFill>
-                </a:ext>
-                <a:ext uri="{91240B29-F687-4F45-9708-019B960494DF}">
-                  <a14:hiddenLine xmlns:a14="http://schemas.microsoft.com/office/drawing/2010/main" w="9525">
-                    <a:solidFill>
-                      <a:srgbClr val="000000"/>
-                    </a:solidFill>
-                    <a:miter lim="800000"/>
-                    <a:headEnd/>
-                    <a:tailEnd/>
-                  </a14:hiddenLine>
-                </a:ext>
-              </a:extLst>
-            </p:spPr>
-          </p:pic>
-          <p:sp>
-            <p:nvSpPr>
-              <p:cNvPr id="10" name="Rectangle 9"/>
-              <p:cNvSpPr/>
-              <p:nvPr/>
-            </p:nvSpPr>
-            <p:spPr>
-              <a:xfrm>
-                <a:off x="2519550" y="3330026"/>
-                <a:ext cx="2239675" cy="1040150"/>
-              </a:xfrm>
-              <a:prstGeom prst="rect">
-                <a:avLst/>
-              </a:prstGeom>
-              <a:noFill/>
-              <a:ln>
-                <a:noFill/>
-              </a:ln>
-            </p:spPr>
-            <p:style>
-              <a:lnRef idx="2">
-                <a:schemeClr val="accent1">
-                  <a:shade val="50000"/>
-                </a:schemeClr>
-              </a:lnRef>
-              <a:fillRef idx="1">
-                <a:schemeClr val="accent1"/>
-              </a:fillRef>
-              <a:effectRef idx="0">
-                <a:schemeClr val="accent1"/>
-              </a:effectRef>
-              <a:fontRef idx="minor">
-                <a:schemeClr val="lt1"/>
-              </a:fontRef>
-            </p:style>
-            <p:txBody>
-              <a:bodyPr lIns="68579" tIns="34289" rIns="68579" bIns="34289" anchor="ctr"/>
-              <a:lstStyle/>
-              <a:p>
-                <a:pPr algn="ctr">
-                  <a:defRPr/>
-                </a:pPr>
-                <a:r>
-                  <a:rPr lang="en-US" b="1" dirty="0">
-                    <a:solidFill>
-                      <a:schemeClr val="tx1"/>
-                    </a:solidFill>
-                  </a:rPr>
-                  <a:t>NORTH</a:t>
-                </a:r>
-              </a:p>
-              <a:p>
-                <a:pPr algn="ctr">
-                  <a:defRPr/>
-                </a:pPr>
-                <a:r>
-                  <a:rPr lang="en-US" dirty="0">
-                    <a:solidFill>
-                      <a:schemeClr val="tx1"/>
-                    </a:solidFill>
-                  </a:rPr>
-                  <a:t>(depth: 2.7m)</a:t>
-                </a:r>
-              </a:p>
-            </p:txBody>
-          </p:sp>
-          <p:sp>
-            <p:nvSpPr>
-              <p:cNvPr id="11" name="Rectangle 10"/>
-              <p:cNvSpPr/>
-              <p:nvPr/>
-            </p:nvSpPr>
-            <p:spPr>
-              <a:xfrm>
-                <a:off x="5400493" y="3330026"/>
-                <a:ext cx="2239676" cy="1040150"/>
-              </a:xfrm>
-              <a:prstGeom prst="rect">
-                <a:avLst/>
-              </a:prstGeom>
-              <a:noFill/>
-              <a:ln>
-                <a:noFill/>
-              </a:ln>
-            </p:spPr>
-            <p:style>
-              <a:lnRef idx="2">
-                <a:schemeClr val="accent1">
-                  <a:shade val="50000"/>
-                </a:schemeClr>
-              </a:lnRef>
-              <a:fillRef idx="1">
-                <a:schemeClr val="accent1"/>
-              </a:fillRef>
-              <a:effectRef idx="0">
-                <a:schemeClr val="accent1"/>
-              </a:effectRef>
-              <a:fontRef idx="minor">
-                <a:schemeClr val="lt1"/>
-              </a:fontRef>
-            </p:style>
-            <p:txBody>
-              <a:bodyPr lIns="68579" tIns="34289" rIns="68579" bIns="34289" anchor="ctr"/>
-              <a:lstStyle/>
-              <a:p>
-                <a:pPr algn="ctr">
-                  <a:defRPr/>
-                </a:pPr>
-                <a:r>
-                  <a:rPr lang="en-US" b="1" dirty="0">
-                    <a:solidFill>
-                      <a:schemeClr val="tx1"/>
-                    </a:solidFill>
-                  </a:rPr>
-                  <a:t>SOUTH</a:t>
-                </a:r>
-              </a:p>
-              <a:p>
-                <a:pPr algn="ctr">
-                  <a:defRPr/>
-                </a:pPr>
-                <a:r>
-                  <a:rPr lang="en-US" dirty="0">
-                    <a:solidFill>
-                      <a:schemeClr val="tx1"/>
-                    </a:solidFill>
-                  </a:rPr>
-                  <a:t>(depth: 2.7m)</a:t>
-                </a:r>
-              </a:p>
-            </p:txBody>
-          </p:sp>
-        </p:grpSp>
-        <p:cxnSp>
-          <p:nvCxnSpPr>
-            <p:cNvPr id="13" name="Straight Connector 12"/>
-            <p:cNvCxnSpPr/>
-            <p:nvPr/>
-          </p:nvCxnSpPr>
-          <p:spPr>
-            <a:xfrm flipV="1">
-              <a:off x="7885276" y="2218613"/>
-              <a:ext cx="688646" cy="535596"/>
-            </a:xfrm>
-            <a:prstGeom prst="line">
-              <a:avLst/>
-            </a:prstGeom>
-            <a:ln w="25400"/>
-          </p:spPr>
-          <p:style>
-            <a:lnRef idx="1">
-              <a:schemeClr val="accent1"/>
-            </a:lnRef>
-            <a:fillRef idx="0">
-              <a:schemeClr val="accent1"/>
-            </a:fillRef>
-            <a:effectRef idx="0">
-              <a:schemeClr val="accent1"/>
-            </a:effectRef>
-            <a:fontRef idx="minor">
-              <a:schemeClr val="tx1"/>
-            </a:fontRef>
-          </p:style>
-        </p:cxnSp>
-        <p:cxnSp>
-          <p:nvCxnSpPr>
-            <p:cNvPr id="15" name="Straight Connector 14"/>
-            <p:cNvCxnSpPr/>
-            <p:nvPr/>
-          </p:nvCxnSpPr>
-          <p:spPr>
-            <a:xfrm flipV="1">
-              <a:off x="1077883" y="2218613"/>
-              <a:ext cx="688646" cy="535596"/>
-            </a:xfrm>
-            <a:prstGeom prst="line">
-              <a:avLst/>
-            </a:prstGeom>
-            <a:ln w="25400"/>
-          </p:spPr>
-          <p:style>
-            <a:lnRef idx="1">
-              <a:schemeClr val="accent1"/>
-            </a:lnRef>
-            <a:fillRef idx="0">
-              <a:schemeClr val="accent1"/>
-            </a:fillRef>
-            <a:effectRef idx="0">
-              <a:schemeClr val="accent1"/>
-            </a:effectRef>
-            <a:fontRef idx="minor">
-              <a:schemeClr val="tx1"/>
-            </a:fontRef>
-          </p:style>
-        </p:cxnSp>
-        <p:cxnSp>
-          <p:nvCxnSpPr>
-            <p:cNvPr id="16" name="Straight Connector 15"/>
-            <p:cNvCxnSpPr/>
-            <p:nvPr/>
-          </p:nvCxnSpPr>
-          <p:spPr>
-            <a:xfrm flipV="1">
-              <a:off x="7885276" y="5104688"/>
-              <a:ext cx="688646" cy="535596"/>
-            </a:xfrm>
-            <a:prstGeom prst="line">
-              <a:avLst/>
-            </a:prstGeom>
-            <a:ln w="25400"/>
-          </p:spPr>
-          <p:style>
-            <a:lnRef idx="1">
-              <a:schemeClr val="accent1"/>
-            </a:lnRef>
-            <a:fillRef idx="0">
-              <a:schemeClr val="accent1"/>
-            </a:fillRef>
-            <a:effectRef idx="0">
-              <a:schemeClr val="accent1"/>
-            </a:effectRef>
-            <a:fontRef idx="minor">
-              <a:schemeClr val="tx1"/>
-            </a:fontRef>
-          </p:style>
-        </p:cxnSp>
-        <p:cxnSp>
-          <p:nvCxnSpPr>
-            <p:cNvPr id="14" name="Straight Connector 13"/>
-            <p:cNvCxnSpPr/>
-            <p:nvPr/>
-          </p:nvCxnSpPr>
-          <p:spPr>
-            <a:xfrm>
-              <a:off x="7885276" y="5640284"/>
-              <a:ext cx="0" cy="637686"/>
-            </a:xfrm>
-            <a:prstGeom prst="line">
-              <a:avLst/>
-            </a:prstGeom>
-            <a:ln w="25400"/>
-          </p:spPr>
-          <p:style>
-            <a:lnRef idx="1">
-              <a:schemeClr val="accent1"/>
-            </a:lnRef>
-            <a:fillRef idx="0">
-              <a:schemeClr val="accent1"/>
-            </a:fillRef>
-            <a:effectRef idx="0">
-              <a:schemeClr val="accent1"/>
-            </a:effectRef>
-            <a:fontRef idx="minor">
-              <a:schemeClr val="tx1"/>
-            </a:fontRef>
-          </p:style>
-        </p:cxnSp>
-        <p:cxnSp>
-          <p:nvCxnSpPr>
-            <p:cNvPr id="19" name="Straight Connector 18"/>
-            <p:cNvCxnSpPr/>
-            <p:nvPr/>
-          </p:nvCxnSpPr>
-          <p:spPr>
-            <a:xfrm>
-              <a:off x="7872576" y="2123727"/>
-              <a:ext cx="0" cy="637686"/>
-            </a:xfrm>
-            <a:prstGeom prst="line">
-              <a:avLst/>
-            </a:prstGeom>
-            <a:ln w="25400"/>
-          </p:spPr>
-          <p:style>
-            <a:lnRef idx="1">
-              <a:schemeClr val="accent1"/>
-            </a:lnRef>
-            <a:fillRef idx="0">
-              <a:schemeClr val="accent1"/>
-            </a:fillRef>
-            <a:effectRef idx="0">
-              <a:schemeClr val="accent1"/>
-            </a:effectRef>
-            <a:fontRef idx="minor">
-              <a:schemeClr val="tx1"/>
-            </a:fontRef>
-          </p:style>
-        </p:cxnSp>
-        <p:cxnSp>
-          <p:nvCxnSpPr>
-            <p:cNvPr id="20" name="Straight Connector 19"/>
-            <p:cNvCxnSpPr/>
-            <p:nvPr/>
-          </p:nvCxnSpPr>
-          <p:spPr>
-            <a:xfrm>
-              <a:off x="1052676" y="5640284"/>
-              <a:ext cx="0" cy="637686"/>
-            </a:xfrm>
-            <a:prstGeom prst="line">
-              <a:avLst/>
-            </a:prstGeom>
-            <a:ln w="25400"/>
-          </p:spPr>
-          <p:style>
-            <a:lnRef idx="1">
-              <a:schemeClr val="accent1"/>
-            </a:lnRef>
-            <a:fillRef idx="0">
-              <a:schemeClr val="accent1"/>
-            </a:fillRef>
-            <a:effectRef idx="0">
-              <a:schemeClr val="accent1"/>
-            </a:effectRef>
-            <a:fontRef idx="minor">
-              <a:schemeClr val="tx1"/>
-            </a:fontRef>
-          </p:style>
-        </p:cxnSp>
-        <p:cxnSp>
-          <p:nvCxnSpPr>
-            <p:cNvPr id="21" name="Straight Connector 20"/>
-            <p:cNvCxnSpPr/>
-            <p:nvPr/>
-          </p:nvCxnSpPr>
-          <p:spPr>
-            <a:xfrm>
-              <a:off x="1052676" y="2122384"/>
-              <a:ext cx="0" cy="637686"/>
-            </a:xfrm>
-            <a:prstGeom prst="line">
-              <a:avLst/>
-            </a:prstGeom>
-            <a:ln w="25400"/>
-          </p:spPr>
-          <p:style>
-            <a:lnRef idx="1">
-              <a:schemeClr val="accent1"/>
-            </a:lnRef>
-            <a:fillRef idx="0">
-              <a:schemeClr val="accent1"/>
-            </a:fillRef>
-            <a:effectRef idx="0">
-              <a:schemeClr val="accent1"/>
-            </a:effectRef>
-            <a:fontRef idx="minor">
-              <a:schemeClr val="tx1"/>
-            </a:fontRef>
-          </p:style>
-        </p:cxnSp>
-      </p:grpSp>
       <p:sp>
         <p:nvSpPr>
           <p:cNvPr id="17" name="Rectangle 16"/>
@@ -7285,7 +7192,7 @@
           <p:nvPr/>
         </p:nvPicPr>
         <p:blipFill>
-          <a:blip r:embed="rId4" cstate="print">
+          <a:blip r:embed="rId3" cstate="print">
             <a:extLst>
               <a:ext uri="{28A0092B-C50C-407E-A947-70E740481C1C}">
                 <a14:useLocalDpi xmlns:a14="http://schemas.microsoft.com/office/drawing/2010/main" val="0"/>
@@ -7336,6 +7243,36 @@
           </a:p>
         </p:txBody>
       </p:sp>
+      <p:pic>
+        <p:nvPicPr>
+          <p:cNvPr id="6" name="Picture 5"/>
+          <p:cNvPicPr>
+            <a:picLocks noChangeAspect="1"/>
+          </p:cNvPicPr>
+          <p:nvPr/>
+        </p:nvPicPr>
+        <p:blipFill>
+          <a:blip r:embed="rId4">
+            <a:extLst>
+              <a:ext uri="{28A0092B-C50C-407E-A947-70E740481C1C}">
+                <a14:useLocalDpi xmlns:a14="http://schemas.microsoft.com/office/drawing/2010/main" val="0"/>
+              </a:ext>
+            </a:extLst>
+          </a:blip>
+          <a:stretch>
+            <a:fillRect/>
+          </a:stretch>
+        </p:blipFill>
+        <p:spPr>
+          <a:xfrm>
+            <a:off x="2815976" y="2253171"/>
+            <a:ext cx="4368596" cy="3089577"/>
+          </a:xfrm>
+          <a:prstGeom prst="rect">
+            <a:avLst/>
+          </a:prstGeom>
+        </p:spPr>
+      </p:pic>
     </p:spTree>
     <p:extLst>
       <p:ext uri="{BB962C8B-B14F-4D97-AF65-F5344CB8AC3E}">
@@ -8769,7 +8706,7 @@
           <p:nvPr/>
         </p:nvPicPr>
         <p:blipFill rotWithShape="1">
-          <a:blip r:embed="rId2">
+          <a:blip r:embed="rId3">
             <a:clrChange>
               <a:clrFrom>
                 <a:srgbClr val="FFFFFF"/>
@@ -8803,7 +8740,7 @@
           <p:nvPr/>
         </p:nvPicPr>
         <p:blipFill rotWithShape="1">
-          <a:blip r:embed="rId3">
+          <a:blip r:embed="rId4">
             <a:clrChange>
               <a:clrFrom>
                 <a:srgbClr val="FFFFFF"/>
@@ -10250,7 +10187,7 @@
           <p:nvPr/>
         </p:nvPicPr>
         <p:blipFill>
-          <a:blip r:embed="rId2">
+          <a:blip r:embed="rId3">
             <a:extLst>
               <a:ext uri="{28A0092B-C50C-407E-A947-70E740481C1C}">
                 <a14:useLocalDpi xmlns:a14="http://schemas.microsoft.com/office/drawing/2010/main" val="0"/>
@@ -10576,7 +10513,7 @@
           <p:nvPr/>
         </p:nvPicPr>
         <p:blipFill>
-          <a:blip r:embed="rId3"/>
+          <a:blip r:embed="rId4"/>
           <a:stretch>
             <a:fillRect/>
           </a:stretch>
@@ -11228,7 +11165,7 @@
           <p:nvPr/>
         </p:nvPicPr>
         <p:blipFill rotWithShape="1">
-          <a:blip r:embed="rId2"/>
+          <a:blip r:embed="rId3"/>
           <a:srcRect l="5948" b="1629"/>
           <a:stretch/>
         </p:blipFill>
@@ -11261,7 +11198,7 @@
           <p:nvPr/>
         </p:nvPicPr>
         <p:blipFill rotWithShape="1">
-          <a:blip r:embed="rId3">
+          <a:blip r:embed="rId4">
             <a:clrChange>
               <a:clrFrom>
                 <a:srgbClr val="DEE2EA"/>
@@ -12690,14 +12627,7 @@
                 <a:latin typeface="Arial" charset="0"/>
                 <a:cs typeface="Arial" charset="0"/>
               </a:rPr>
-              <a:t>Low </a:t>
-            </a:r>
-            <a:r>
-              <a:rPr lang="en-US" altLang="nl-BE" kern="0" smtClean="0">
-                <a:latin typeface="Arial" charset="0"/>
-                <a:cs typeface="Arial" charset="0"/>
-              </a:rPr>
-              <a:t>energy building</a:t>
+              <a:t>Low energy building</a:t>
             </a:r>
             <a:endParaRPr lang="en-US" altLang="nl-BE" kern="0" dirty="0">
               <a:latin typeface="Arial" charset="0"/>
@@ -12772,436 +12702,36 @@
           </a:p>
         </p:txBody>
       </p:sp>
-      <p:grpSp>
-        <p:nvGrpSpPr>
-          <p:cNvPr id="21508" name="Group 7"/>
-          <p:cNvGrpSpPr>
-            <a:grpSpLocks/>
-          </p:cNvGrpSpPr>
+      <p:pic>
+        <p:nvPicPr>
+          <p:cNvPr id="4" name="Picture 3"/>
+          <p:cNvPicPr>
+            <a:picLocks noChangeAspect="1"/>
+          </p:cNvPicPr>
           <p:nvPr/>
-        </p:nvGrpSpPr>
-        <p:grpSpPr bwMode="auto">
-          <a:xfrm>
-            <a:off x="1028698" y="2702255"/>
-            <a:ext cx="7055893" cy="3575715"/>
-            <a:chOff x="921142" y="2261292"/>
-            <a:chExt cx="8479338" cy="4213004"/>
-          </a:xfrm>
-        </p:grpSpPr>
-        <p:pic>
-          <p:nvPicPr>
-            <p:cNvPr id="21509" name="Picture 2" descr="C:\Users\bwf\Desktop\Picture1.png"/>
-            <p:cNvPicPr>
-              <a:picLocks noChangeAspect="1" noChangeArrowheads="1"/>
-            </p:cNvPicPr>
-            <p:nvPr/>
-          </p:nvPicPr>
-          <p:blipFill>
-            <a:blip r:embed="rId3">
-              <a:clrChange>
-                <a:clrFrom>
-                  <a:srgbClr val="FFFFFF"/>
-                </a:clrFrom>
-                <a:clrTo>
-                  <a:srgbClr val="FFFFFF">
-                    <a:alpha val="0"/>
-                  </a:srgbClr>
-                </a:clrTo>
-              </a:clrChange>
-              <a:extLst>
-                <a:ext uri="{28A0092B-C50C-407E-A947-70E740481C1C}">
-                  <a14:useLocalDpi xmlns:a14="http://schemas.microsoft.com/office/drawing/2010/main" val="0"/>
-                </a:ext>
-              </a:extLst>
-            </a:blip>
-            <a:srcRect/>
-            <a:stretch>
-              <a:fillRect/>
-            </a:stretch>
-          </p:blipFill>
-          <p:spPr bwMode="auto">
-            <a:xfrm>
-              <a:off x="921142" y="2261292"/>
-              <a:ext cx="8479338" cy="4213004"/>
-            </a:xfrm>
-            <a:prstGeom prst="rect">
-              <a:avLst/>
-            </a:prstGeom>
-            <a:noFill/>
-            <a:ln>
-              <a:noFill/>
-            </a:ln>
+        </p:nvPicPr>
+        <p:blipFill>
+          <a:blip r:embed="rId3">
             <a:extLst>
-              <a:ext uri="{909E8E84-426E-40DD-AFC4-6F175D3DCCD1}">
-                <a14:hiddenFill xmlns:a14="http://schemas.microsoft.com/office/drawing/2010/main">
-                  <a:solidFill>
-                    <a:srgbClr val="FFFFFF"/>
-                  </a:solidFill>
-                </a14:hiddenFill>
-              </a:ext>
-              <a:ext uri="{91240B29-F687-4F45-9708-019B960494DF}">
-                <a14:hiddenLine xmlns:a14="http://schemas.microsoft.com/office/drawing/2010/main" w="9525">
-                  <a:solidFill>
-                    <a:srgbClr val="000000"/>
-                  </a:solidFill>
-                  <a:miter lim="800000"/>
-                  <a:headEnd/>
-                  <a:tailEnd/>
-                </a14:hiddenLine>
+              <a:ext uri="{28A0092B-C50C-407E-A947-70E740481C1C}">
+                <a14:useLocalDpi xmlns:a14="http://schemas.microsoft.com/office/drawing/2010/main" val="0"/>
               </a:ext>
             </a:extLst>
-          </p:spPr>
-        </p:pic>
-        <p:sp>
-          <p:nvSpPr>
-            <p:cNvPr id="10" name="Rectangle 9"/>
-            <p:cNvSpPr/>
-            <p:nvPr/>
-          </p:nvSpPr>
-          <p:spPr>
-            <a:xfrm>
-              <a:off x="2519550" y="3330026"/>
-              <a:ext cx="2239675" cy="1040150"/>
-            </a:xfrm>
-            <a:prstGeom prst="rect">
-              <a:avLst/>
-            </a:prstGeom>
-            <a:noFill/>
-            <a:ln>
-              <a:noFill/>
-            </a:ln>
-          </p:spPr>
-          <p:style>
-            <a:lnRef idx="2">
-              <a:schemeClr val="accent1">
-                <a:shade val="50000"/>
-              </a:schemeClr>
-            </a:lnRef>
-            <a:fillRef idx="1">
-              <a:schemeClr val="accent1"/>
-            </a:fillRef>
-            <a:effectRef idx="0">
-              <a:schemeClr val="accent1"/>
-            </a:effectRef>
-            <a:fontRef idx="minor">
-              <a:schemeClr val="lt1"/>
-            </a:fontRef>
-          </p:style>
-          <p:txBody>
-            <a:bodyPr lIns="68579" tIns="34289" rIns="68579" bIns="34289" anchor="ctr"/>
-            <a:lstStyle/>
-            <a:p>
-              <a:pPr algn="ctr">
-                <a:defRPr/>
-              </a:pPr>
-              <a:r>
-                <a:rPr lang="en-US" b="1" dirty="0">
-                  <a:solidFill>
-                    <a:schemeClr val="tx1"/>
-                  </a:solidFill>
-                </a:rPr>
-                <a:t>NORTH</a:t>
-              </a:r>
-            </a:p>
-            <a:p>
-              <a:pPr algn="ctr">
-                <a:defRPr/>
-              </a:pPr>
-              <a:r>
-                <a:rPr lang="en-US" dirty="0">
-                  <a:solidFill>
-                    <a:schemeClr val="tx1"/>
-                  </a:solidFill>
-                </a:rPr>
-                <a:t>(depth: 2.7m)</a:t>
-              </a:r>
-            </a:p>
-          </p:txBody>
-        </p:sp>
-        <p:sp>
-          <p:nvSpPr>
-            <p:cNvPr id="11" name="Rectangle 10"/>
-            <p:cNvSpPr/>
-            <p:nvPr/>
-          </p:nvSpPr>
-          <p:spPr>
-            <a:xfrm>
-              <a:off x="5400493" y="3330026"/>
-              <a:ext cx="2239676" cy="1040150"/>
-            </a:xfrm>
-            <a:prstGeom prst="rect">
-              <a:avLst/>
-            </a:prstGeom>
-            <a:noFill/>
-            <a:ln>
-              <a:noFill/>
-            </a:ln>
-          </p:spPr>
-          <p:style>
-            <a:lnRef idx="2">
-              <a:schemeClr val="accent1">
-                <a:shade val="50000"/>
-              </a:schemeClr>
-            </a:lnRef>
-            <a:fillRef idx="1">
-              <a:schemeClr val="accent1"/>
-            </a:fillRef>
-            <a:effectRef idx="0">
-              <a:schemeClr val="accent1"/>
-            </a:effectRef>
-            <a:fontRef idx="minor">
-              <a:schemeClr val="lt1"/>
-            </a:fontRef>
-          </p:style>
-          <p:txBody>
-            <a:bodyPr lIns="68579" tIns="34289" rIns="68579" bIns="34289" anchor="ctr"/>
-            <a:lstStyle/>
-            <a:p>
-              <a:pPr algn="ctr">
-                <a:defRPr/>
-              </a:pPr>
-              <a:r>
-                <a:rPr lang="en-US" b="1" dirty="0">
-                  <a:solidFill>
-                    <a:schemeClr val="tx1"/>
-                  </a:solidFill>
-                </a:rPr>
-                <a:t>SOUTH</a:t>
-              </a:r>
-            </a:p>
-            <a:p>
-              <a:pPr algn="ctr">
-                <a:defRPr/>
-              </a:pPr>
-              <a:r>
-                <a:rPr lang="en-US" dirty="0">
-                  <a:solidFill>
-                    <a:schemeClr val="tx1"/>
-                  </a:solidFill>
-                </a:rPr>
-                <a:t>(depth: 2.7m)</a:t>
-              </a:r>
-            </a:p>
-          </p:txBody>
-        </p:sp>
-      </p:grpSp>
-      <p:cxnSp>
-        <p:nvCxnSpPr>
-          <p:cNvPr id="13" name="Straight Connector 12"/>
-          <p:cNvCxnSpPr/>
-          <p:nvPr/>
-        </p:nvCxnSpPr>
+          </a:blip>
+          <a:stretch>
+            <a:fillRect/>
+          </a:stretch>
+        </p:blipFill>
         <p:spPr>
-          <a:xfrm flipV="1">
-            <a:off x="7885276" y="2218613"/>
-            <a:ext cx="688646" cy="535596"/>
+          <a:xfrm>
+            <a:off x="1276583" y="1719944"/>
+            <a:ext cx="7209650" cy="5098840"/>
           </a:xfrm>
-          <a:prstGeom prst="line">
+          <a:prstGeom prst="rect">
             <a:avLst/>
           </a:prstGeom>
-          <a:ln w="25400"/>
         </p:spPr>
-        <p:style>
-          <a:lnRef idx="1">
-            <a:schemeClr val="accent1"/>
-          </a:lnRef>
-          <a:fillRef idx="0">
-            <a:schemeClr val="accent1"/>
-          </a:fillRef>
-          <a:effectRef idx="0">
-            <a:schemeClr val="accent1"/>
-          </a:effectRef>
-          <a:fontRef idx="minor">
-            <a:schemeClr val="tx1"/>
-          </a:fontRef>
-        </p:style>
-      </p:cxnSp>
-      <p:cxnSp>
-        <p:nvCxnSpPr>
-          <p:cNvPr id="15" name="Straight Connector 14"/>
-          <p:cNvCxnSpPr/>
-          <p:nvPr/>
-        </p:nvCxnSpPr>
-        <p:spPr>
-          <a:xfrm flipV="1">
-            <a:off x="1077883" y="2218613"/>
-            <a:ext cx="688646" cy="535596"/>
-          </a:xfrm>
-          <a:prstGeom prst="line">
-            <a:avLst/>
-          </a:prstGeom>
-          <a:ln w="25400"/>
-        </p:spPr>
-        <p:style>
-          <a:lnRef idx="1">
-            <a:schemeClr val="accent1"/>
-          </a:lnRef>
-          <a:fillRef idx="0">
-            <a:schemeClr val="accent1"/>
-          </a:fillRef>
-          <a:effectRef idx="0">
-            <a:schemeClr val="accent1"/>
-          </a:effectRef>
-          <a:fontRef idx="minor">
-            <a:schemeClr val="tx1"/>
-          </a:fontRef>
-        </p:style>
-      </p:cxnSp>
-      <p:cxnSp>
-        <p:nvCxnSpPr>
-          <p:cNvPr id="16" name="Straight Connector 15"/>
-          <p:cNvCxnSpPr/>
-          <p:nvPr/>
-        </p:nvCxnSpPr>
-        <p:spPr>
-          <a:xfrm flipV="1">
-            <a:off x="7885276" y="5104688"/>
-            <a:ext cx="688646" cy="535596"/>
-          </a:xfrm>
-          <a:prstGeom prst="line">
-            <a:avLst/>
-          </a:prstGeom>
-          <a:ln w="25400"/>
-        </p:spPr>
-        <p:style>
-          <a:lnRef idx="1">
-            <a:schemeClr val="accent1"/>
-          </a:lnRef>
-          <a:fillRef idx="0">
-            <a:schemeClr val="accent1"/>
-          </a:fillRef>
-          <a:effectRef idx="0">
-            <a:schemeClr val="accent1"/>
-          </a:effectRef>
-          <a:fontRef idx="minor">
-            <a:schemeClr val="tx1"/>
-          </a:fontRef>
-        </p:style>
-      </p:cxnSp>
-      <p:cxnSp>
-        <p:nvCxnSpPr>
-          <p:cNvPr id="14" name="Straight Connector 13"/>
-          <p:cNvCxnSpPr/>
-          <p:nvPr/>
-        </p:nvCxnSpPr>
-        <p:spPr>
-          <a:xfrm>
-            <a:off x="7885276" y="5640284"/>
-            <a:ext cx="0" cy="637686"/>
-          </a:xfrm>
-          <a:prstGeom prst="line">
-            <a:avLst/>
-          </a:prstGeom>
-          <a:ln w="25400"/>
-        </p:spPr>
-        <p:style>
-          <a:lnRef idx="1">
-            <a:schemeClr val="accent1"/>
-          </a:lnRef>
-          <a:fillRef idx="0">
-            <a:schemeClr val="accent1"/>
-          </a:fillRef>
-          <a:effectRef idx="0">
-            <a:schemeClr val="accent1"/>
-          </a:effectRef>
-          <a:fontRef idx="minor">
-            <a:schemeClr val="tx1"/>
-          </a:fontRef>
-        </p:style>
-      </p:cxnSp>
-      <p:cxnSp>
-        <p:nvCxnSpPr>
-          <p:cNvPr id="19" name="Straight Connector 18"/>
-          <p:cNvCxnSpPr/>
-          <p:nvPr/>
-        </p:nvCxnSpPr>
-        <p:spPr>
-          <a:xfrm>
-            <a:off x="7872576" y="2123727"/>
-            <a:ext cx="0" cy="637686"/>
-          </a:xfrm>
-          <a:prstGeom prst="line">
-            <a:avLst/>
-          </a:prstGeom>
-          <a:ln w="25400"/>
-        </p:spPr>
-        <p:style>
-          <a:lnRef idx="1">
-            <a:schemeClr val="accent1"/>
-          </a:lnRef>
-          <a:fillRef idx="0">
-            <a:schemeClr val="accent1"/>
-          </a:fillRef>
-          <a:effectRef idx="0">
-            <a:schemeClr val="accent1"/>
-          </a:effectRef>
-          <a:fontRef idx="minor">
-            <a:schemeClr val="tx1"/>
-          </a:fontRef>
-        </p:style>
-      </p:cxnSp>
-      <p:cxnSp>
-        <p:nvCxnSpPr>
-          <p:cNvPr id="20" name="Straight Connector 19"/>
-          <p:cNvCxnSpPr/>
-          <p:nvPr/>
-        </p:nvCxnSpPr>
-        <p:spPr>
-          <a:xfrm>
-            <a:off x="1052676" y="5640284"/>
-            <a:ext cx="0" cy="637686"/>
-          </a:xfrm>
-          <a:prstGeom prst="line">
-            <a:avLst/>
-          </a:prstGeom>
-          <a:ln w="25400"/>
-        </p:spPr>
-        <p:style>
-          <a:lnRef idx="1">
-            <a:schemeClr val="accent1"/>
-          </a:lnRef>
-          <a:fillRef idx="0">
-            <a:schemeClr val="accent1"/>
-          </a:fillRef>
-          <a:effectRef idx="0">
-            <a:schemeClr val="accent1"/>
-          </a:effectRef>
-          <a:fontRef idx="minor">
-            <a:schemeClr val="tx1"/>
-          </a:fontRef>
-        </p:style>
-      </p:cxnSp>
-      <p:cxnSp>
-        <p:nvCxnSpPr>
-          <p:cNvPr id="21" name="Straight Connector 20"/>
-          <p:cNvCxnSpPr/>
-          <p:nvPr/>
-        </p:nvCxnSpPr>
-        <p:spPr>
-          <a:xfrm>
-            <a:off x="1052676" y="2122384"/>
-            <a:ext cx="0" cy="637686"/>
-          </a:xfrm>
-          <a:prstGeom prst="line">
-            <a:avLst/>
-          </a:prstGeom>
-          <a:ln w="25400"/>
-        </p:spPr>
-        <p:style>
-          <a:lnRef idx="1">
-            <a:schemeClr val="accent1"/>
-          </a:lnRef>
-          <a:fillRef idx="0">
-            <a:schemeClr val="accent1"/>
-          </a:fillRef>
-          <a:effectRef idx="0">
-            <a:schemeClr val="accent1"/>
-          </a:effectRef>
-          <a:fontRef idx="minor">
-            <a:schemeClr val="tx1"/>
-          </a:fontRef>
-        </p:style>
-      </p:cxnSp>
+      </p:pic>
     </p:spTree>
     <p:extLst>
       <p:ext uri="{BB962C8B-B14F-4D97-AF65-F5344CB8AC3E}">
@@ -13312,6 +12842,24 @@
             <a:pPr>
               <a:defRPr/>
             </a:pPr>
+            <a:endParaRPr lang="en-US" altLang="nl-BE" sz="2160" dirty="0" smtClean="0">
+              <a:latin typeface="Arial" charset="0"/>
+              <a:cs typeface="Arial" charset="0"/>
+            </a:endParaRPr>
+          </a:p>
+          <a:p>
+            <a:pPr>
+              <a:defRPr/>
+            </a:pPr>
+            <a:endParaRPr lang="en-US" altLang="nl-BE" sz="2160" dirty="0">
+              <a:latin typeface="Arial" charset="0"/>
+              <a:cs typeface="Arial" charset="0"/>
+            </a:endParaRPr>
+          </a:p>
+          <a:p>
+            <a:pPr>
+              <a:defRPr/>
+            </a:pPr>
             <a:r>
               <a:rPr lang="en-US" altLang="nl-BE" sz="2160" dirty="0" smtClean="0">
                 <a:latin typeface="Arial" charset="0"/>
@@ -13397,123 +12945,6 @@
               <a:defRPr/>
             </a:pPr>
             <a:endParaRPr lang="en-US" altLang="nl-BE" sz="3600" dirty="0">
-              <a:latin typeface="Arial" charset="0"/>
-              <a:cs typeface="Arial" charset="0"/>
-            </a:endParaRPr>
-          </a:p>
-          <a:p>
-            <a:pPr>
-              <a:defRPr/>
-            </a:pPr>
-            <a:r>
-              <a:rPr lang="en-US" altLang="nl-BE" sz="2160" dirty="0">
-                <a:latin typeface="Arial" charset="0"/>
-                <a:cs typeface="Arial" charset="0"/>
-              </a:rPr>
-              <a:t>Windows</a:t>
-            </a:r>
-          </a:p>
-          <a:p>
-            <a:pPr lvl="1">
-              <a:defRPr/>
-            </a:pPr>
-            <a:r>
-              <a:rPr lang="en-US" altLang="nl-BE" sz="1600" dirty="0">
-                <a:latin typeface="Arial" charset="0"/>
-                <a:cs typeface="Arial" charset="0"/>
-              </a:rPr>
-              <a:t>Glazing: Saint </a:t>
-            </a:r>
-            <a:r>
-              <a:rPr lang="en-US" altLang="nl-BE" sz="1600" dirty="0" err="1">
-                <a:latin typeface="Arial" charset="0"/>
-                <a:cs typeface="Arial" charset="0"/>
-              </a:rPr>
-              <a:t>Gobain</a:t>
-            </a:r>
-            <a:r>
-              <a:rPr lang="en-US" altLang="nl-BE" sz="1600" dirty="0">
-                <a:latin typeface="Arial" charset="0"/>
-                <a:cs typeface="Arial" charset="0"/>
-              </a:rPr>
-              <a:t> </a:t>
-            </a:r>
-            <a:r>
-              <a:rPr lang="en-US" altLang="nl-BE" sz="1600" dirty="0" err="1">
-                <a:latin typeface="Arial" charset="0"/>
-                <a:cs typeface="Arial" charset="0"/>
-              </a:rPr>
-              <a:t>Clima</a:t>
-            </a:r>
-            <a:r>
-              <a:rPr lang="en-US" altLang="nl-BE" sz="1600" dirty="0">
-                <a:latin typeface="Arial" charset="0"/>
-                <a:cs typeface="Arial" charset="0"/>
-              </a:rPr>
-              <a:t> Plus </a:t>
-            </a:r>
-            <a:r>
-              <a:rPr lang="en-US" altLang="nl-BE" sz="1600" dirty="0" err="1">
-                <a:latin typeface="Arial" charset="0"/>
-                <a:cs typeface="Arial" charset="0"/>
-              </a:rPr>
-              <a:t>Futur</a:t>
-            </a:r>
-            <a:r>
-              <a:rPr lang="en-US" altLang="nl-BE" sz="1600" dirty="0">
-                <a:latin typeface="Arial" charset="0"/>
-                <a:cs typeface="Arial" charset="0"/>
-              </a:rPr>
-              <a:t> (U = 1.4 W/m</a:t>
-            </a:r>
-            <a:r>
-              <a:rPr lang="en-US" altLang="nl-BE" sz="1600" baseline="30000" dirty="0">
-                <a:latin typeface="Arial" charset="0"/>
-                <a:cs typeface="Arial" charset="0"/>
-              </a:rPr>
-              <a:t>2</a:t>
-            </a:r>
-            <a:r>
-              <a:rPr lang="en-US" altLang="nl-BE" sz="1600" dirty="0">
-                <a:latin typeface="Arial" charset="0"/>
-                <a:cs typeface="Arial" charset="0"/>
-              </a:rPr>
-              <a:t>K, g = 0.755)</a:t>
-            </a:r>
-          </a:p>
-          <a:p>
-            <a:pPr lvl="1">
-              <a:defRPr/>
-            </a:pPr>
-            <a:r>
-              <a:rPr lang="en-US" altLang="nl-BE" sz="1600" dirty="0">
-                <a:latin typeface="Arial" charset="0"/>
-                <a:cs typeface="Arial" charset="0"/>
-              </a:rPr>
-              <a:t>Frame: U-value=2.5 W/m</a:t>
-            </a:r>
-            <a:r>
-              <a:rPr lang="en-US" altLang="nl-BE" sz="1600" baseline="30000" dirty="0">
-                <a:latin typeface="Arial" charset="0"/>
-                <a:cs typeface="Arial" charset="0"/>
-              </a:rPr>
-              <a:t>2</a:t>
-            </a:r>
-            <a:r>
-              <a:rPr lang="en-US" altLang="nl-BE" sz="1600" dirty="0">
-                <a:latin typeface="Arial" charset="0"/>
-                <a:cs typeface="Arial" charset="0"/>
-              </a:rPr>
-              <a:t>k , fraction of the window: </a:t>
-            </a:r>
-            <a:r>
-              <a:rPr lang="en-US" altLang="nl-BE" sz="1600" dirty="0" smtClean="0">
-                <a:latin typeface="Arial" charset="0"/>
-                <a:cs typeface="Arial" charset="0"/>
-              </a:rPr>
-              <a:t>f=0.15</a:t>
-            </a:r>
-            <a:endParaRPr lang="en-US" altLang="nl-BE" sz="1600" dirty="0">
               <a:latin typeface="Arial" charset="0"/>
               <a:cs typeface="Arial" charset="0"/>
             </a:endParaRPr>
@@ -13529,14 +12960,14 @@
           <p:nvPr>
             <p:extLst>
               <p:ext uri="{D42A27DB-BD31-4B8C-83A1-F6EECF244321}">
-                <p14:modId xmlns:p14="http://schemas.microsoft.com/office/powerpoint/2010/main" val="1088069393"/>
+                <p14:modId xmlns:p14="http://schemas.microsoft.com/office/powerpoint/2010/main" val="1162837575"/>
               </p:ext>
             </p:extLst>
           </p:nvPr>
         </p:nvGraphicFramePr>
         <p:xfrm>
           <a:off x="747890" y="690680"/>
-          <a:ext cx="8270544" cy="1929512"/>
+          <a:ext cx="8313548" cy="2255662"/>
         </p:xfrm>
         <a:graphic>
           <a:graphicData uri="http://schemas.openxmlformats.org/drawingml/2006/table">
@@ -13552,28 +12983,28 @@
                     </a:ext>
                   </a:extLst>
                 </a:gridCol>
-                <a:gridCol w="1409450">
+                <a:gridCol w="1474763">
                   <a:extLst>
                     <a:ext uri="{9D8B030D-6E8A-4147-A177-3AD203B41FA5}">
                       <a16:colId xmlns:a16="http://schemas.microsoft.com/office/drawing/2014/main" val="20001"/>
                     </a:ext>
                   </a:extLst>
                 </a:gridCol>
-                <a:gridCol w="1394045">
+                <a:gridCol w="1382486">
                   <a:extLst>
                     <a:ext uri="{9D8B030D-6E8A-4147-A177-3AD203B41FA5}">
                       <a16:colId xmlns:a16="http://schemas.microsoft.com/office/drawing/2014/main" val="20002"/>
                     </a:ext>
                   </a:extLst>
                 </a:gridCol>
-                <a:gridCol w="1323832">
+                <a:gridCol w="1426028">
                   <a:extLst>
                     <a:ext uri="{9D8B030D-6E8A-4147-A177-3AD203B41FA5}">
                       <a16:colId xmlns:a16="http://schemas.microsoft.com/office/drawing/2014/main" val="20003"/>
                     </a:ext>
                   </a:extLst>
                 </a:gridCol>
-                <a:gridCol w="1550362">
+                <a:gridCol w="1437416">
                   <a:extLst>
                     <a:ext uri="{9D8B030D-6E8A-4147-A177-3AD203B41FA5}">
                       <a16:colId xmlns:a16="http://schemas.microsoft.com/office/drawing/2014/main" val="20004"/>
@@ -13777,7 +13208,15 @@
                             <a:schemeClr val="tx2"/>
                           </a:solidFill>
                         </a:rPr>
-                        <a:t>Tile (d=0.01m)</a:t>
+                        <a:t>Tile (</a:t>
+                      </a:r>
+                      <a:r>
+                        <a:rPr lang="en-US" sz="1600" dirty="0" smtClean="0">
+                          <a:solidFill>
+                            <a:schemeClr val="tx2"/>
+                          </a:solidFill>
+                        </a:rPr>
+                        <a:t>d=0.01)</a:t>
                       </a:r>
                       <a:endParaRPr lang="en-GB" sz="1600" dirty="0">
                         <a:solidFill>
@@ -13926,7 +13365,7 @@
                             <a:schemeClr val="tx2"/>
                           </a:solidFill>
                         </a:rPr>
-                        <a:t>Slate(d=0,08)</a:t>
+                        <a:t>Slate(d=0.01)</a:t>
                       </a:r>
                       <a:endParaRPr lang="en-GB" sz="1600" dirty="0">
                         <a:solidFill>
@@ -13970,7 +13409,7 @@
                             <a:schemeClr val="tx2"/>
                           </a:solidFill>
                         </a:rPr>
-                        <a:t>Concrete(0,20</a:t>
+                        <a:t>Concrete(0,20)</a:t>
                       </a:r>
                       <a:endParaRPr lang="en-GB" sz="1600" dirty="0">
                         <a:solidFill>
@@ -14027,15 +13466,7 @@
                             <a:schemeClr val="tx2"/>
                           </a:solidFill>
                         </a:rPr>
-                        <a:t>Exterior </a:t>
-                      </a:r>
-                      <a:r>
-                        <a:rPr lang="en-US" sz="1600" dirty="0" smtClean="0">
-                          <a:solidFill>
-                            <a:schemeClr val="tx2"/>
-                          </a:solidFill>
-                        </a:rPr>
-                        <a:t>wall</a:t>
+                        <a:t>Exterior wall</a:t>
                       </a:r>
                       <a:endParaRPr lang="en-GB" sz="1600" dirty="0">
                         <a:solidFill>
@@ -14290,6 +13721,133 @@
                 </a:extLst>
               </a:tr>
               <a:tr h="0">
+                <a:tc>
+                  <a:txBody>
+                    <a:bodyPr/>
+                    <a:lstStyle/>
+                    <a:p>
+                      <a:r>
+                        <a:rPr lang="en-GB" sz="1600" dirty="0" smtClean="0">
+                          <a:solidFill>
+                            <a:schemeClr val="tx2"/>
+                          </a:solidFill>
+                        </a:rPr>
+                        <a:t>Slab</a:t>
+                      </a:r>
+                      <a:endParaRPr lang="en-GB" sz="1600" dirty="0">
+                        <a:solidFill>
+                          <a:schemeClr val="tx2"/>
+                        </a:solidFill>
+                      </a:endParaRPr>
+                    </a:p>
+                  </a:txBody>
+                  <a:tcPr marL="41147" marR="41147" marT="41155" marB="41155">
+                    <a:noFill/>
+                  </a:tcPr>
+                </a:tc>
+                <a:tc>
+                  <a:txBody>
+                    <a:bodyPr/>
+                    <a:lstStyle/>
+                    <a:p>
+                      <a:r>
+                        <a:rPr lang="en-GB" sz="1600" dirty="0" smtClean="0">
+                          <a:solidFill>
+                            <a:schemeClr val="tx2"/>
+                          </a:solidFill>
+                        </a:rPr>
+                        <a:t>Concrete(0.35)</a:t>
+                      </a:r>
+                      <a:endParaRPr lang="en-GB" sz="1600" dirty="0">
+                        <a:solidFill>
+                          <a:schemeClr val="tx2"/>
+                        </a:solidFill>
+                      </a:endParaRPr>
+                    </a:p>
+                  </a:txBody>
+                  <a:tcPr marL="41147" marR="41147" marT="41155" marB="41155">
+                    <a:noFill/>
+                  </a:tcPr>
+                </a:tc>
+                <a:tc>
+                  <a:txBody>
+                    <a:bodyPr/>
+                    <a:lstStyle/>
+                    <a:p>
+                      <a:r>
+                        <a:rPr lang="en-GB" sz="1600" dirty="0" smtClean="0">
+                          <a:solidFill>
+                            <a:schemeClr val="tx2"/>
+                          </a:solidFill>
+                        </a:rPr>
+                        <a:t>Screed(0.05)</a:t>
+                      </a:r>
+                      <a:endParaRPr lang="en-GB" sz="1600" dirty="0">
+                        <a:solidFill>
+                          <a:schemeClr val="tx2"/>
+                        </a:solidFill>
+                      </a:endParaRPr>
+                    </a:p>
+                  </a:txBody>
+                  <a:tcPr marL="41147" marR="41147" marT="41155" marB="41155">
+                    <a:noFill/>
+                  </a:tcPr>
+                </a:tc>
+                <a:tc>
+                  <a:txBody>
+                    <a:bodyPr/>
+                    <a:lstStyle/>
+                    <a:p>
+                      <a:endParaRPr lang="en-GB" sz="1600" dirty="0">
+                        <a:solidFill>
+                          <a:schemeClr val="tx2"/>
+                        </a:solidFill>
+                      </a:endParaRPr>
+                    </a:p>
+                  </a:txBody>
+                  <a:tcPr marL="41147" marR="41147" marT="41155" marB="41155">
+                    <a:noFill/>
+                  </a:tcPr>
+                </a:tc>
+                <a:tc>
+                  <a:txBody>
+                    <a:bodyPr/>
+                    <a:lstStyle/>
+                    <a:p>
+                      <a:endParaRPr lang="en-GB" sz="1600" dirty="0">
+                        <a:solidFill>
+                          <a:schemeClr val="tx2"/>
+                        </a:solidFill>
+                      </a:endParaRPr>
+                    </a:p>
+                  </a:txBody>
+                  <a:tcPr marL="41147" marR="41147" marT="41155" marB="41155">
+                    <a:noFill/>
+                  </a:tcPr>
+                </a:tc>
+                <a:tc>
+                  <a:txBody>
+                    <a:bodyPr/>
+                    <a:lstStyle/>
+                    <a:p>
+                      <a:endParaRPr lang="en-GB" sz="1600" dirty="0">
+                        <a:solidFill>
+                          <a:schemeClr val="tx2"/>
+                        </a:solidFill>
+                      </a:endParaRPr>
+                    </a:p>
+                  </a:txBody>
+                  <a:tcPr marL="41147" marR="41147" marT="41155" marB="41155">
+                    <a:noFill/>
+                  </a:tcPr>
+                </a:tc>
+                <a:extLst>
+                  <a:ext uri="{0D108BD9-81ED-4DB2-BD59-A6C34878D82A}">
+                    <a16:rowId xmlns:a16="http://schemas.microsoft.com/office/drawing/2014/main" val="3713600056"/>
+                  </a:ext>
+                </a:extLst>
+              </a:tr>
+              <a:tr h="0">
                 <a:tc gridSpan="6">
                   <a:txBody>
                     <a:bodyPr/>
@@ -14301,7 +13859,15 @@
                             <a:schemeClr val="tx2"/>
                           </a:solidFill>
                         </a:rPr>
-                        <a:t>* Floor heating tube is situated at</a:t>
+                        <a:t>* Floor heating </a:t>
+                      </a:r>
+                      <a:r>
+                        <a:rPr lang="en-US" sz="1400" b="0" dirty="0" smtClean="0">
+                          <a:solidFill>
+                            <a:schemeClr val="tx2"/>
+                          </a:solidFill>
+                        </a:rPr>
+                        <a:t>tube is situated at</a:t>
                       </a:r>
                       <a:r>
                         <a:rPr lang="en-US" sz="1400" b="0" baseline="0" dirty="0" smtClean="0">
@@ -14401,14 +13967,14 @@
           <p:nvPr>
             <p:extLst>
               <p:ext uri="{D42A27DB-BD31-4B8C-83A1-F6EECF244321}">
-                <p14:modId xmlns:p14="http://schemas.microsoft.com/office/powerpoint/2010/main" val="2021284198"/>
+                <p14:modId xmlns:p14="http://schemas.microsoft.com/office/powerpoint/2010/main" val="1435567242"/>
               </p:ext>
             </p:extLst>
           </p:nvPr>
         </p:nvGraphicFramePr>
         <p:xfrm>
-          <a:off x="2498745" y="2750742"/>
-          <a:ext cx="4762122" cy="2300582"/>
+          <a:off x="2498745" y="3697799"/>
+          <a:ext cx="4762122" cy="2952882"/>
         </p:xfrm>
         <a:graphic>
           <a:graphicData uri="http://schemas.openxmlformats.org/drawingml/2006/table">
@@ -15493,6 +15059,179 @@
                         <a:defRPr/>
                       </a:pPr>
                       <a:r>
+                        <a:rPr lang="gl-ES" altLang="nl-BE" sz="1600" b="1" kern="1200" dirty="0" smtClean="0">
+                          <a:solidFill>
+                            <a:schemeClr val="tx2"/>
+                          </a:solidFill>
+                          <a:latin typeface="+mn-lt"/>
+                          <a:ea typeface="+mn-ea"/>
+                          <a:cs typeface="+mn-cs"/>
+                        </a:rPr>
+                        <a:t>Slate</a:t>
+                      </a:r>
+                      <a:endParaRPr lang="en-US" altLang="nl-BE" sz="1600" b="1" kern="1200" dirty="0" smtClean="0">
+                        <a:solidFill>
+                          <a:schemeClr val="tx2"/>
+                        </a:solidFill>
+                        <a:latin typeface="+mn-lt"/>
+                        <a:ea typeface="+mn-ea"/>
+                        <a:cs typeface="+mn-cs"/>
+                      </a:endParaRPr>
+                    </a:p>
+                  </a:txBody>
+                  <a:tcPr marL="41147" marR="41147" marT="41155" marB="41155">
+                    <a:noFill/>
+                  </a:tcPr>
+                </a:tc>
+                <a:tc>
+                  <a:txBody>
+                    <a:bodyPr/>
+                    <a:lstStyle/>
+                    <a:p>
+                      <a:pPr marL="0" marR="0" lvl="1" indent="0" algn="ctr" defTabSz="685800" rtl="0" eaLnBrk="1" fontAlgn="auto" latinLnBrk="0" hangingPunct="1">
+                        <a:lnSpc>
+                          <a:spcPct val="100000"/>
+                        </a:lnSpc>
+                        <a:spcBef>
+                          <a:spcPts val="0"/>
+                        </a:spcBef>
+                        <a:spcAft>
+                          <a:spcPts val="0"/>
+                        </a:spcAft>
+                        <a:buClrTx/>
+                        <a:buSzTx/>
+                        <a:buFontTx/>
+                        <a:buNone/>
+                        <a:tabLst/>
+                        <a:defRPr/>
+                      </a:pPr>
+                      <a:r>
+                        <a:rPr lang="en-GB" sz="1600" dirty="0" smtClean="0">
+                          <a:solidFill>
+                            <a:schemeClr val="tx2"/>
+                          </a:solidFill>
+                          <a:latin typeface="+mn-lt"/>
+                        </a:rPr>
+                        <a:t>2.01</a:t>
+                      </a:r>
+                      <a:endParaRPr lang="en-GB" sz="1600" dirty="0">
+                        <a:solidFill>
+                          <a:schemeClr val="tx2"/>
+                        </a:solidFill>
+                        <a:latin typeface="+mn-lt"/>
+                      </a:endParaRPr>
+                    </a:p>
+                  </a:txBody>
+                  <a:tcPr marL="41147" marR="41147" marT="41155" marB="41155">
+                    <a:noFill/>
+                  </a:tcPr>
+                </a:tc>
+                <a:tc>
+                  <a:txBody>
+                    <a:bodyPr/>
+                    <a:lstStyle/>
+                    <a:p>
+                      <a:pPr marL="0" marR="0" lvl="1" indent="0" algn="ctr" defTabSz="685800" rtl="0" eaLnBrk="1" fontAlgn="auto" latinLnBrk="0" hangingPunct="1">
+                        <a:lnSpc>
+                          <a:spcPct val="100000"/>
+                        </a:lnSpc>
+                        <a:spcBef>
+                          <a:spcPts val="0"/>
+                        </a:spcBef>
+                        <a:spcAft>
+                          <a:spcPts val="0"/>
+                        </a:spcAft>
+                        <a:buClrTx/>
+                        <a:buSzTx/>
+                        <a:buFontTx/>
+                        <a:buNone/>
+                        <a:tabLst/>
+                        <a:defRPr/>
+                      </a:pPr>
+                      <a:r>
+                        <a:rPr lang="en-GB" sz="1600" dirty="0" smtClean="0">
+                          <a:solidFill>
+                            <a:schemeClr val="tx2"/>
+                          </a:solidFill>
+                          <a:latin typeface="+mn-lt"/>
+                        </a:rPr>
+                        <a:t>760</a:t>
+                      </a:r>
+                      <a:endParaRPr lang="en-GB" sz="1600" dirty="0">
+                        <a:solidFill>
+                          <a:schemeClr val="tx2"/>
+                        </a:solidFill>
+                        <a:latin typeface="+mn-lt"/>
+                      </a:endParaRPr>
+                    </a:p>
+                  </a:txBody>
+                  <a:tcPr marL="41147" marR="41147" marT="41155" marB="41155">
+                    <a:noFill/>
+                  </a:tcPr>
+                </a:tc>
+                <a:tc>
+                  <a:txBody>
+                    <a:bodyPr/>
+                    <a:lstStyle/>
+                    <a:p>
+                      <a:pPr marL="0" marR="0" lvl="1" indent="0" algn="ctr" defTabSz="685800" rtl="0" eaLnBrk="1" fontAlgn="auto" latinLnBrk="0" hangingPunct="1">
+                        <a:lnSpc>
+                          <a:spcPct val="100000"/>
+                        </a:lnSpc>
+                        <a:spcBef>
+                          <a:spcPts val="0"/>
+                        </a:spcBef>
+                        <a:spcAft>
+                          <a:spcPts val="0"/>
+                        </a:spcAft>
+                        <a:buClrTx/>
+                        <a:buSzTx/>
+                        <a:buFontTx/>
+                        <a:buNone/>
+                        <a:tabLst/>
+                        <a:defRPr/>
+                      </a:pPr>
+                      <a:r>
+                        <a:rPr lang="gl-ES" altLang="nl-BE" sz="1600" kern="1200" dirty="0" smtClean="0">
+                          <a:solidFill>
+                            <a:schemeClr val="tx2"/>
+                          </a:solidFill>
+                          <a:latin typeface="+mn-lt"/>
+                          <a:ea typeface="+mn-ea"/>
+                          <a:cs typeface="Arial" charset="0"/>
+                        </a:rPr>
+                        <a:t>2700</a:t>
+                      </a:r>
+                      <a:endParaRPr lang="en-US" altLang="nl-BE" sz="1600" kern="1200" dirty="0" smtClean="0">
+                        <a:solidFill>
+                          <a:schemeClr val="tx2"/>
+                        </a:solidFill>
+                        <a:latin typeface="+mn-lt"/>
+                        <a:ea typeface="+mn-ea"/>
+                        <a:cs typeface="Arial" charset="0"/>
+                      </a:endParaRPr>
+                    </a:p>
+                  </a:txBody>
+                  <a:tcPr marL="41147" marR="41147" marT="41155" marB="41155">
+                    <a:noFill/>
+                  </a:tcPr>
+                </a:tc>
+                <a:extLst>
+                  <a:ext uri="{0D108BD9-81ED-4DB2-BD59-A6C34878D82A}">
+                    <a16:rowId xmlns:a16="http://schemas.microsoft.com/office/drawing/2014/main" val="1037661391"/>
+                  </a:ext>
+                </a:extLst>
+              </a:tr>
+              <a:tr h="0">
+                <a:tc>
+                  <a:txBody>
+                    <a:bodyPr/>
+                    <a:lstStyle/>
+                    <a:p>
+                      <a:pPr marL="0" lvl="1" indent="0" algn="l" defTabSz="685800" rtl="0" eaLnBrk="1" latinLnBrk="0" hangingPunct="1">
+                        <a:defRPr/>
+                      </a:pPr>
+                      <a:r>
                         <a:rPr lang="en-US" altLang="nl-BE" sz="1600" b="1" kern="1200" dirty="0" smtClean="0">
                           <a:solidFill>
                             <a:schemeClr val="tx2"/>
@@ -15640,6 +15379,179 @@
                   </a:ext>
                 </a:extLst>
               </a:tr>
+              <a:tr h="0">
+                <a:tc>
+                  <a:txBody>
+                    <a:bodyPr/>
+                    <a:lstStyle/>
+                    <a:p>
+                      <a:pPr marL="0" lvl="1" indent="0" algn="l" defTabSz="685800" rtl="0" eaLnBrk="1" latinLnBrk="0" hangingPunct="1">
+                        <a:defRPr/>
+                      </a:pPr>
+                      <a:r>
+                        <a:rPr lang="gl-ES" altLang="nl-BE" sz="1600" b="1" kern="1200" dirty="0" smtClean="0">
+                          <a:solidFill>
+                            <a:schemeClr val="tx2"/>
+                          </a:solidFill>
+                          <a:latin typeface="+mn-lt"/>
+                          <a:ea typeface="+mn-ea"/>
+                          <a:cs typeface="+mn-cs"/>
+                        </a:rPr>
+                        <a:t>PUR</a:t>
+                      </a:r>
+                      <a:endParaRPr lang="en-US" altLang="nl-BE" sz="1600" b="1" kern="1200" dirty="0" smtClean="0">
+                        <a:solidFill>
+                          <a:schemeClr val="tx2"/>
+                        </a:solidFill>
+                        <a:latin typeface="+mn-lt"/>
+                        <a:ea typeface="+mn-ea"/>
+                        <a:cs typeface="+mn-cs"/>
+                      </a:endParaRPr>
+                    </a:p>
+                  </a:txBody>
+                  <a:tcPr marL="41147" marR="41147" marT="41155" marB="41155">
+                    <a:noFill/>
+                  </a:tcPr>
+                </a:tc>
+                <a:tc>
+                  <a:txBody>
+                    <a:bodyPr/>
+                    <a:lstStyle/>
+                    <a:p>
+                      <a:pPr marL="0" marR="0" lvl="1" indent="0" algn="ctr" defTabSz="685800" rtl="0" eaLnBrk="1" fontAlgn="auto" latinLnBrk="0" hangingPunct="1">
+                        <a:lnSpc>
+                          <a:spcPct val="100000"/>
+                        </a:lnSpc>
+                        <a:spcBef>
+                          <a:spcPts val="0"/>
+                        </a:spcBef>
+                        <a:spcAft>
+                          <a:spcPts val="0"/>
+                        </a:spcAft>
+                        <a:buClrTx/>
+                        <a:buSzTx/>
+                        <a:buFontTx/>
+                        <a:buNone/>
+                        <a:tabLst/>
+                        <a:defRPr/>
+                      </a:pPr>
+                      <a:r>
+                        <a:rPr lang="en-GB" sz="1600" dirty="0" smtClean="0">
+                          <a:solidFill>
+                            <a:schemeClr val="tx2"/>
+                          </a:solidFill>
+                          <a:latin typeface="+mn-lt"/>
+                        </a:rPr>
+                        <a:t>0.02</a:t>
+                      </a:r>
+                      <a:endParaRPr lang="en-GB" sz="1600" dirty="0">
+                        <a:solidFill>
+                          <a:schemeClr val="tx2"/>
+                        </a:solidFill>
+                        <a:latin typeface="+mn-lt"/>
+                      </a:endParaRPr>
+                    </a:p>
+                  </a:txBody>
+                  <a:tcPr marL="41147" marR="41147" marT="41155" marB="41155">
+                    <a:noFill/>
+                  </a:tcPr>
+                </a:tc>
+                <a:tc>
+                  <a:txBody>
+                    <a:bodyPr/>
+                    <a:lstStyle/>
+                    <a:p>
+                      <a:pPr marL="0" marR="0" lvl="1" indent="0" algn="ctr" defTabSz="685800" rtl="0" eaLnBrk="1" fontAlgn="auto" latinLnBrk="0" hangingPunct="1">
+                        <a:lnSpc>
+                          <a:spcPct val="100000"/>
+                        </a:lnSpc>
+                        <a:spcBef>
+                          <a:spcPts val="0"/>
+                        </a:spcBef>
+                        <a:spcAft>
+                          <a:spcPts val="0"/>
+                        </a:spcAft>
+                        <a:buClrTx/>
+                        <a:buSzTx/>
+                        <a:buFontTx/>
+                        <a:buNone/>
+                        <a:tabLst/>
+                        <a:defRPr/>
+                      </a:pPr>
+                      <a:r>
+                        <a:rPr lang="en-GB" sz="1600" dirty="0" smtClean="0">
+                          <a:solidFill>
+                            <a:schemeClr val="tx2"/>
+                          </a:solidFill>
+                          <a:latin typeface="+mn-lt"/>
+                        </a:rPr>
+                        <a:t>1470</a:t>
+                      </a:r>
+                      <a:endParaRPr lang="en-GB" sz="1600" dirty="0">
+                        <a:solidFill>
+                          <a:schemeClr val="tx2"/>
+                        </a:solidFill>
+                        <a:latin typeface="+mn-lt"/>
+                      </a:endParaRPr>
+                    </a:p>
+                  </a:txBody>
+                  <a:tcPr marL="41147" marR="41147" marT="41155" marB="41155">
+                    <a:noFill/>
+                  </a:tcPr>
+                </a:tc>
+                <a:tc>
+                  <a:txBody>
+                    <a:bodyPr/>
+                    <a:lstStyle/>
+                    <a:p>
+                      <a:pPr marL="0" marR="0" lvl="1" indent="0" algn="ctr" defTabSz="685800" rtl="0" eaLnBrk="1" fontAlgn="auto" latinLnBrk="0" hangingPunct="1">
+                        <a:lnSpc>
+                          <a:spcPct val="100000"/>
+                        </a:lnSpc>
+                        <a:spcBef>
+                          <a:spcPts val="0"/>
+                        </a:spcBef>
+                        <a:spcAft>
+                          <a:spcPts val="0"/>
+                        </a:spcAft>
+                        <a:buClrTx/>
+                        <a:buSzTx/>
+                        <a:buFontTx/>
+                        <a:buNone/>
+                        <a:tabLst/>
+                        <a:defRPr/>
+                      </a:pPr>
+                      <a:r>
+                        <a:rPr lang="gl-ES" altLang="nl-BE" sz="1600" kern="1200" dirty="0" smtClean="0">
+                          <a:solidFill>
+                            <a:schemeClr val="tx2"/>
+                          </a:solidFill>
+                          <a:latin typeface="+mn-lt"/>
+                          <a:ea typeface="+mn-ea"/>
+                          <a:cs typeface="Arial" charset="0"/>
+                        </a:rPr>
+                        <a:t>30</a:t>
+                      </a:r>
+                      <a:endParaRPr lang="en-US" altLang="nl-BE" sz="1600" kern="1200" dirty="0" smtClean="0">
+                        <a:solidFill>
+                          <a:schemeClr val="tx2"/>
+                        </a:solidFill>
+                        <a:latin typeface="+mn-lt"/>
+                        <a:ea typeface="+mn-ea"/>
+                        <a:cs typeface="Arial" charset="0"/>
+                      </a:endParaRPr>
+                    </a:p>
+                  </a:txBody>
+                  <a:tcPr marL="41147" marR="41147" marT="41155" marB="41155">
+                    <a:noFill/>
+                  </a:tcPr>
+                </a:tc>
+                <a:extLst>
+                  <a:ext uri="{0D108BD9-81ED-4DB2-BD59-A6C34878D82A}">
+                    <a16:rowId xmlns:a16="http://schemas.microsoft.com/office/drawing/2014/main" val="1890671307"/>
+                  </a:ext>
+                </a:extLst>
+              </a:tr>
             </a:tbl>
           </a:graphicData>
         </a:graphic>
@@ -15702,6 +15614,158 @@
             <a:normAutofit/>
           </a:bodyPr>
           <a:lstStyle/>
+          <a:p>
+            <a:pPr>
+              <a:defRPr/>
+            </a:pPr>
+            <a:r>
+              <a:rPr lang="en-US" altLang="nl-BE" sz="2160" dirty="0">
+                <a:latin typeface="Arial" charset="0"/>
+                <a:cs typeface="Arial" charset="0"/>
+              </a:rPr>
+              <a:t>Windows</a:t>
+            </a:r>
+          </a:p>
+          <a:p>
+            <a:pPr lvl="1">
+              <a:defRPr/>
+            </a:pPr>
+            <a:r>
+              <a:rPr lang="en-US" altLang="nl-BE" sz="1600" dirty="0">
+                <a:latin typeface="Arial" charset="0"/>
+                <a:cs typeface="Arial" charset="0"/>
+              </a:rPr>
+              <a:t>Glazing: Saint </a:t>
+            </a:r>
+            <a:r>
+              <a:rPr lang="en-US" altLang="nl-BE" sz="1600" dirty="0" err="1">
+                <a:latin typeface="Arial" charset="0"/>
+                <a:cs typeface="Arial" charset="0"/>
+              </a:rPr>
+              <a:t>Gobain</a:t>
+            </a:r>
+            <a:r>
+              <a:rPr lang="en-US" altLang="nl-BE" sz="1600" dirty="0">
+                <a:latin typeface="Arial" charset="0"/>
+                <a:cs typeface="Arial" charset="0"/>
+              </a:rPr>
+              <a:t> </a:t>
+            </a:r>
+            <a:r>
+              <a:rPr lang="en-US" altLang="nl-BE" sz="1600" dirty="0" err="1">
+                <a:latin typeface="Arial" charset="0"/>
+                <a:cs typeface="Arial" charset="0"/>
+              </a:rPr>
+              <a:t>Clima</a:t>
+            </a:r>
+            <a:r>
+              <a:rPr lang="en-US" altLang="nl-BE" sz="1600" dirty="0">
+                <a:latin typeface="Arial" charset="0"/>
+                <a:cs typeface="Arial" charset="0"/>
+              </a:rPr>
+              <a:t> Plus </a:t>
+            </a:r>
+            <a:r>
+              <a:rPr lang="en-US" altLang="nl-BE" sz="1600" dirty="0" err="1">
+                <a:latin typeface="Arial" charset="0"/>
+                <a:cs typeface="Arial" charset="0"/>
+              </a:rPr>
+              <a:t>Futur</a:t>
+            </a:r>
+            <a:r>
+              <a:rPr lang="en-US" altLang="nl-BE" sz="1600" dirty="0">
+                <a:latin typeface="Arial" charset="0"/>
+                <a:cs typeface="Arial" charset="0"/>
+              </a:rPr>
+              <a:t> (U = 1.4 W/m</a:t>
+            </a:r>
+            <a:r>
+              <a:rPr lang="en-US" altLang="nl-BE" sz="1600" baseline="30000" dirty="0">
+                <a:latin typeface="Arial" charset="0"/>
+                <a:cs typeface="Arial" charset="0"/>
+              </a:rPr>
+              <a:t>2</a:t>
+            </a:r>
+            <a:r>
+              <a:rPr lang="en-US" altLang="nl-BE" sz="1600" dirty="0">
+                <a:latin typeface="Arial" charset="0"/>
+                <a:cs typeface="Arial" charset="0"/>
+              </a:rPr>
+              <a:t>K, g = 0.755</a:t>
+            </a:r>
+            <a:r>
+              <a:rPr lang="en-US" altLang="nl-BE" sz="1600" dirty="0" smtClean="0">
+                <a:latin typeface="Arial" charset="0"/>
+                <a:cs typeface="Arial" charset="0"/>
+              </a:rPr>
+              <a:t>) </a:t>
+            </a:r>
+            <a:endParaRPr lang="en-US" altLang="nl-BE" sz="1600" dirty="0">
+              <a:latin typeface="Arial" charset="0"/>
+              <a:cs typeface="Arial" charset="0"/>
+            </a:endParaRPr>
+          </a:p>
+          <a:p>
+            <a:pPr lvl="1">
+              <a:defRPr/>
+            </a:pPr>
+            <a:r>
+              <a:rPr lang="en-US" altLang="nl-BE" sz="1600" dirty="0">
+                <a:latin typeface="Arial" charset="0"/>
+                <a:cs typeface="Arial" charset="0"/>
+              </a:rPr>
+              <a:t>Frame: U-value=2.5 W/m</a:t>
+            </a:r>
+            <a:r>
+              <a:rPr lang="en-US" altLang="nl-BE" sz="1600" baseline="30000" dirty="0">
+                <a:latin typeface="Arial" charset="0"/>
+                <a:cs typeface="Arial" charset="0"/>
+              </a:rPr>
+              <a:t>2</a:t>
+            </a:r>
+            <a:r>
+              <a:rPr lang="en-US" altLang="nl-BE" sz="1600" dirty="0">
+                <a:latin typeface="Arial" charset="0"/>
+                <a:cs typeface="Arial" charset="0"/>
+              </a:rPr>
+              <a:t>k , fraction of the window: </a:t>
+            </a:r>
+            <a:r>
+              <a:rPr lang="en-US" altLang="nl-BE" sz="1600" dirty="0" smtClean="0">
+                <a:latin typeface="Arial" charset="0"/>
+                <a:cs typeface="Arial" charset="0"/>
+              </a:rPr>
+              <a:t>f=0.15</a:t>
+            </a:r>
+          </a:p>
+          <a:p>
+            <a:pPr lvl="1">
+              <a:defRPr/>
+            </a:pPr>
+            <a:r>
+              <a:rPr lang="gl-ES" altLang="nl-BE" sz="1600" dirty="0" smtClean="0">
+                <a:latin typeface="Arial" charset="0"/>
+                <a:cs typeface="Arial" charset="0"/>
+              </a:rPr>
+              <a:t>Shadowing: On south window</a:t>
+            </a:r>
+          </a:p>
+          <a:p>
+            <a:pPr lvl="1">
+              <a:defRPr/>
+            </a:pPr>
+            <a:r>
+              <a:rPr lang="gl-ES" altLang="nl-BE" sz="1600" dirty="0" smtClean="0">
+                <a:latin typeface="Arial" charset="0"/>
+                <a:cs typeface="Arial" charset="0"/>
+              </a:rPr>
+              <a:t>Window Size: 2m x 1m</a:t>
+            </a:r>
+            <a:endParaRPr lang="en-US" altLang="nl-BE" sz="2160" dirty="0" smtClean="0">
+              <a:latin typeface="Arial" charset="0"/>
+              <a:cs typeface="Arial" charset="0"/>
+            </a:endParaRPr>
+          </a:p>
           <a:p>
             <a:pPr>
               <a:lnSpc>

</xml_diff>